<commit_message>
Continuous lecture progress and more code for variadic params
git-svn-id: https://svn.code.sf.net/p/cpp-lects-rus/code/trunk@237 39143b06-f351-456c-9f92-4cd32fad6823
</commit_message>
<xml_diff>
--- a/slides/sep2017/06-templclasses.pptx
+++ b/slides/sep2017/06-templclasses.pptx
@@ -399,7 +399,7 @@
             <a:fld id="{96DFF08F-DC6B-4601-B491-B0F83F6DD2DA}" type="datetimeFigureOut">
               <a:rPr lang="en-US" dirty="0"/>
               <a:pPr/>
-              <a:t>11/8/2017</a:t>
+              <a:t>11/14/2017</a:t>
             </a:fld>
             <a:endParaRPr lang="en-US" dirty="0"/>
           </a:p>
@@ -616,7 +616,7 @@
           <a:p>
             <a:fld id="{96DFF08F-DC6B-4601-B491-B0F83F6DD2DA}" type="datetimeFigureOut">
               <a:rPr lang="en-US" dirty="0"/>
-              <a:t>11/8/2017</a:t>
+              <a:t>11/14/2017</a:t>
             </a:fld>
             <a:endParaRPr lang="en-US" dirty="0"/>
           </a:p>
@@ -791,7 +791,7 @@
           <a:p>
             <a:fld id="{96DFF08F-DC6B-4601-B491-B0F83F6DD2DA}" type="datetimeFigureOut">
               <a:rPr lang="en-US" dirty="0"/>
-              <a:t>11/8/2017</a:t>
+              <a:t>11/14/2017</a:t>
             </a:fld>
             <a:endParaRPr lang="en-US" dirty="0"/>
           </a:p>
@@ -956,7 +956,7 @@
           <a:p>
             <a:fld id="{96DFF08F-DC6B-4601-B491-B0F83F6DD2DA}" type="datetimeFigureOut">
               <a:rPr lang="en-US" dirty="0"/>
-              <a:t>11/8/2017</a:t>
+              <a:t>11/14/2017</a:t>
             </a:fld>
             <a:endParaRPr lang="en-US" dirty="0"/>
           </a:p>
@@ -1202,7 +1202,7 @@
           <a:p>
             <a:fld id="{96DFF08F-DC6B-4601-B491-B0F83F6DD2DA}" type="datetimeFigureOut">
               <a:rPr lang="en-US" dirty="0"/>
-              <a:t>11/8/2017</a:t>
+              <a:t>11/14/2017</a:t>
             </a:fld>
             <a:endParaRPr lang="en-US" dirty="0"/>
           </a:p>
@@ -1520,7 +1520,7 @@
           <a:p>
             <a:fld id="{96DFF08F-DC6B-4601-B491-B0F83F6DD2DA}" type="datetimeFigureOut">
               <a:rPr lang="en-US" dirty="0"/>
-              <a:t>11/8/2017</a:t>
+              <a:t>11/14/2017</a:t>
             </a:fld>
             <a:endParaRPr lang="en-US" dirty="0"/>
           </a:p>
@@ -1939,7 +1939,7 @@
           <a:p>
             <a:fld id="{96DFF08F-DC6B-4601-B491-B0F83F6DD2DA}" type="datetimeFigureOut">
               <a:rPr lang="en-US" dirty="0"/>
-              <a:t>11/8/2017</a:t>
+              <a:t>11/14/2017</a:t>
             </a:fld>
             <a:endParaRPr lang="en-US" dirty="0"/>
           </a:p>
@@ -2052,7 +2052,7 @@
           <a:p>
             <a:fld id="{96DFF08F-DC6B-4601-B491-B0F83F6DD2DA}" type="datetimeFigureOut">
               <a:rPr lang="en-US" dirty="0"/>
-              <a:t>11/8/2017</a:t>
+              <a:t>11/14/2017</a:t>
             </a:fld>
             <a:endParaRPr lang="en-US" dirty="0"/>
           </a:p>
@@ -2142,7 +2142,7 @@
           <a:p>
             <a:fld id="{96DFF08F-DC6B-4601-B491-B0F83F6DD2DA}" type="datetimeFigureOut">
               <a:rPr lang="en-US" dirty="0"/>
-              <a:t>11/8/2017</a:t>
+              <a:t>11/14/2017</a:t>
             </a:fld>
             <a:endParaRPr lang="en-US" dirty="0"/>
           </a:p>
@@ -2427,7 +2427,7 @@
           <a:p>
             <a:fld id="{96DFF08F-DC6B-4601-B491-B0F83F6DD2DA}" type="datetimeFigureOut">
               <a:rPr lang="en-US" dirty="0"/>
-              <a:t>11/8/2017</a:t>
+              <a:t>11/14/2017</a:t>
             </a:fld>
             <a:endParaRPr lang="en-US" dirty="0"/>
           </a:p>
@@ -2694,7 +2694,7 @@
           <a:p>
             <a:fld id="{96DFF08F-DC6B-4601-B491-B0F83F6DD2DA}" type="datetimeFigureOut">
               <a:rPr lang="en-US" dirty="0"/>
-              <a:t>11/8/2017</a:t>
+              <a:t>11/14/2017</a:t>
             </a:fld>
             <a:endParaRPr lang="en-US" dirty="0"/>
           </a:p>
@@ -2943,7 +2943,7 @@
             <a:fld id="{96DFF08F-DC6B-4601-B491-B0F83F6DD2DA}" type="datetimeFigureOut">
               <a:rPr lang="en-US" dirty="0"/>
               <a:pPr/>
-              <a:t>11/8/2017</a:t>
+              <a:t>11/14/2017</a:t>
             </a:fld>
             <a:endParaRPr lang="en-US" dirty="0"/>
           </a:p>
@@ -10022,7 +10022,15 @@
           <a:p>
             <a:r>
               <a:rPr lang="ru-RU" smtClean="0"/>
-              <a:t>Первая фаза: до инстанциацирования. Шаблоны проходят общую синтаксическую проверку, а также разрешаются </a:t>
+              <a:t>Первая фаза: до </a:t>
+            </a:r>
+            <a:r>
+              <a:rPr lang="ru-RU" smtClean="0"/>
+              <a:t>инстанциирования</a:t>
+            </a:r>
+            <a:r>
+              <a:rPr lang="ru-RU" smtClean="0"/>
+              <a:t>. Шаблоны проходят общую синтаксическую проверку, а также разрешаются </a:t>
             </a:r>
             <a:r>
               <a:rPr lang="ru-RU" smtClean="0">
@@ -14889,25 +14897,7 @@
                 </a:solidFill>
                 <a:latin typeface="Consolas" panose="020B0609020204030204" pitchFamily="49" charset="0"/>
               </a:rPr>
-              <a:t>template </a:t>
-            </a:r>
-            <a:r>
-              <a:rPr lang="en-US" smtClean="0">
-                <a:solidFill>
-                  <a:srgbClr val="0000FF"/>
-                </a:solidFill>
-                <a:latin typeface="Consolas" panose="020B0609020204030204" pitchFamily="49" charset="0"/>
-              </a:rPr>
-              <a:t>&lt;&gt;                </a:t>
-            </a:r>
-            <a:r>
-              <a:rPr lang="en-US" smtClean="0">
-                <a:solidFill>
-                  <a:srgbClr val="0000FF"/>
-                </a:solidFill>
-                <a:latin typeface="Consolas" panose="020B0609020204030204" pitchFamily="49" charset="0"/>
-              </a:rPr>
-              <a:t>                // </a:t>
+              <a:t>template &lt;&gt;                                // </a:t>
             </a:r>
             <a:r>
               <a:rPr lang="ru-RU" smtClean="0">
@@ -21320,11 +21310,7 @@
             </a:r>
             <a:r>
               <a:rPr lang="en-US" smtClean="0"/>
-              <a:t>}/</a:t>
-            </a:r>
-            <a:r>
-              <a:rPr lang="en-US" smtClean="0"/>
-              <a:t>cpp_code/classtemplate</a:t>
+              <a:t>}/cpp_code/classtemplate</a:t>
             </a:r>
             <a:r>
               <a:rPr lang="en-US"/>

</xml_diff>